<commit_message>
Updated poster_draft with better information on BioWordVec
</commit_message>
<xml_diff>
--- a/poster_draft_update_SV Status.pptx
+++ b/poster_draft_update_SV Status.pptx
@@ -3472,14 +3472,14 @@
           <a:p>
             <a:r>
               <a:rPr lang="en-US" sz="4300" b="0" dirty="0"/>
-              <a:t>Prediction of Single Ventricle Congenital Heart Disease from Free Text</a:t>
+              <a:t>Improving Prediction of Single Ventricle Congenital Heart Disease with Free Text</a:t>
             </a:r>
             <a:br>
               <a:rPr lang="en-US" sz="4300" b="0" dirty="0"/>
             </a:br>
             <a:r>
               <a:rPr lang="en-US" sz="4300" b="0" dirty="0"/>
-              <a:t>Tobias O’Leary, Devin Koehl</a:t>
+              <a:t>Devin Koehl, Tobias O’Leary</a:t>
             </a:r>
             <a:br>
               <a:rPr lang="en-US" sz="4300" b="0" dirty="0"/>
@@ -4159,12 +4159,20 @@
                 </a:spcBef>
               </a:pPr>
               <a:r>
+                <a:rPr lang="en-US" altLang="en-US" sz="2939" b="1" dirty="0" err="1">
+                  <a:solidFill>
+                    <a:schemeClr val="bg1"/>
+                  </a:solidFill>
+                </a:rPr>
+                <a:t>BioWordVec</a:t>
+              </a:r>
+              <a:r>
                 <a:rPr lang="en-US" altLang="en-US" sz="2939" b="1" dirty="0">
                   <a:solidFill>
                     <a:schemeClr val="bg1"/>
                   </a:solidFill>
                 </a:rPr>
-                <a:t>Bio2Vec </a:t>
+                <a:t> </a:t>
               </a:r>
             </a:p>
           </p:txBody>
@@ -4359,14 +4367,14 @@
             </a:ln>
             <a:extLst>
               <a:ext uri="{909E8E84-426E-40dd-AFC4-6F175D3DCCD1}">
-                <a14:hiddenFill xmlns="" xmlns:a14="http://schemas.microsoft.com/office/drawing/2010/main">
+                <a14:hiddenFill xmlns:a14="http://schemas.microsoft.com/office/drawing/2010/main" xmlns="">
                   <a:solidFill>
                     <a:srgbClr val="FFFFFF"/>
                   </a:solidFill>
                 </a14:hiddenFill>
               </a:ext>
               <a:ext uri="{91240B29-F687-4f45-9708-019B960494DF}">
-                <a14:hiddenLine xmlns="" xmlns:a14="http://schemas.microsoft.com/office/drawing/2010/main" w="9525">
+                <a14:hiddenLine xmlns:a14="http://schemas.microsoft.com/office/drawing/2010/main" xmlns="" w="9525">
                   <a:solidFill>
                     <a:srgbClr val="000000"/>
                   </a:solidFill>
@@ -5394,32 +5402,112 @@
               <a:buChar char="•"/>
             </a:pPr>
             <a:r>
+              <a:rPr lang="en-US" sz="2400" dirty="0" err="1">
+                <a:solidFill>
+                  <a:schemeClr val="tx1"/>
+                </a:solidFill>
+              </a:rPr>
+              <a:t>BioWordVec</a:t>
+            </a:r>
+            <a:r>
               <a:rPr lang="en-US" sz="2400" dirty="0">
                 <a:solidFill>
                   <a:schemeClr val="tx1"/>
                 </a:solidFill>
               </a:rPr>
-              <a:t>Bio2Vec is a platform that enables the development of machine learning and data analytics methods to be applied on biological Big Data, with the aim of discovering molecular mechanisms underlying complex disease and drugs’ mode of action. </a:t>
-            </a:r>
-          </a:p>
-          <a:p>
-            <a:pPr marL="342900" indent="-342900" algn="l">
-              <a:buFont typeface="Arial" panose="020B0604020202020204" pitchFamily="34" charset="0"/>
-              <a:buChar char="•"/>
-            </a:pPr>
+              <a:t> is a </a:t>
+            </a:r>
+            <a:r>
+              <a:rPr lang="en-US" sz="2400" dirty="0" err="1">
+                <a:solidFill>
+                  <a:schemeClr val="tx1"/>
+                </a:solidFill>
+              </a:rPr>
+              <a:t>fastText</a:t>
+            </a:r>
             <a:r>
               <a:rPr lang="en-US" sz="2400" dirty="0">
                 <a:solidFill>
                   <a:schemeClr val="tx1"/>
                 </a:solidFill>
               </a:rPr>
-              <a:t>It covers embeddings from text and knowledge graphs such as GO terms, proteins, drugs, diseases, proteins and protein interactions. </a:t>
-            </a:r>
-            <a:endParaRPr lang="en-US" sz="2800" dirty="0">
+              <a:t> model for creating biomedical word embeddings with </a:t>
+            </a:r>
+            <a:r>
+              <a:rPr lang="en-US" sz="2400" dirty="0" err="1">
+                <a:solidFill>
+                  <a:schemeClr val="tx1"/>
+                </a:solidFill>
+              </a:rPr>
+              <a:t>subword</a:t>
+            </a:r>
+            <a:r>
+              <a:rPr lang="en-US" sz="2400" dirty="0">
+                <a:solidFill>
+                  <a:schemeClr val="tx1"/>
+                </a:solidFill>
+              </a:rPr>
+              <a:t> information. It was trained using the PubMed corpora and </a:t>
+            </a:r>
+            <a:r>
+              <a:rPr lang="en-US" sz="2400" dirty="0" err="1">
+                <a:solidFill>
+                  <a:schemeClr val="tx1"/>
+                </a:solidFill>
+              </a:rPr>
+              <a:t>MeSH</a:t>
+            </a:r>
+            <a:r>
+              <a:rPr lang="en-US" sz="2400" dirty="0">
+                <a:solidFill>
+                  <a:schemeClr val="tx1"/>
+                </a:solidFill>
+              </a:rPr>
+              <a:t>. The use of </a:t>
+            </a:r>
+            <a:r>
+              <a:rPr lang="en-US" sz="2400" dirty="0" err="1">
+                <a:solidFill>
+                  <a:schemeClr val="tx1"/>
+                </a:solidFill>
+              </a:rPr>
+              <a:t>subwords</a:t>
+            </a:r>
+            <a:r>
+              <a:rPr lang="en-US" sz="2400" dirty="0">
+                <a:solidFill>
+                  <a:schemeClr val="tx1"/>
+                </a:solidFill>
+              </a:rPr>
+              <a:t> allows the model to produce embedding for </a:t>
+            </a:r>
+            <a:r>
+              <a:rPr lang="en-US" sz="2400">
+                <a:solidFill>
+                  <a:schemeClr val="tx1"/>
+                </a:solidFill>
+              </a:rPr>
+              <a:t>OOV tokens. </a:t>
+            </a:r>
+            <a:endParaRPr lang="en-US" sz="2400" dirty="0">
               <a:solidFill>
                 <a:schemeClr val="tx1"/>
               </a:solidFill>
             </a:endParaRPr>
+          </a:p>
+          <a:p>
+            <a:pPr marL="342900" indent="-342900" algn="l">
+              <a:buFont typeface="Arial" panose="020B0604020202020204" pitchFamily="34" charset="0"/>
+              <a:buChar char="•"/>
+            </a:pPr>
+            <a:r>
+              <a:rPr lang="en-US" sz="2400" dirty="0">
+                <a:solidFill>
+                  <a:schemeClr val="tx1"/>
+                </a:solidFill>
+              </a:rPr>
+              <a:t>We used a pre-trained model provided by NCBI to create 200-dimensional Averaged Word Embeddings for text fields in our dataset.</a:t>
+            </a:r>
           </a:p>
         </p:txBody>
       </p:sp>
@@ -5630,14 +5718,14 @@
             </a:ln>
             <a:extLst>
               <a:ext uri="{909E8E84-426E-40dd-AFC4-6F175D3DCCD1}">
-                <a14:hiddenFill xmlns="" xmlns:a14="http://schemas.microsoft.com/office/drawing/2010/main">
+                <a14:hiddenFill xmlns:a14="http://schemas.microsoft.com/office/drawing/2010/main" xmlns="">
                   <a:solidFill>
                     <a:srgbClr val="FFFFFF"/>
                   </a:solidFill>
                 </a14:hiddenFill>
               </a:ext>
               <a:ext uri="{91240B29-F687-4f45-9708-019B960494DF}">
-                <a14:hiddenLine xmlns="" xmlns:a14="http://schemas.microsoft.com/office/drawing/2010/main" w="9525">
+                <a14:hiddenLine xmlns:a14="http://schemas.microsoft.com/office/drawing/2010/main" xmlns="" w="9525">
                   <a:solidFill>
                     <a:srgbClr val="000000"/>
                   </a:solidFill>
@@ -6106,10 +6194,6 @@
               <a:buChar char="•"/>
             </a:pPr>
             <a:r>
-              <a:rPr lang="en-US" sz="2400" dirty="0"/>
-              <a:t>.</a:t>
-            </a:r>
-            <a:r>
               <a:rPr lang="en-US" sz="2400" dirty="0" err="1"/>
               <a:t>XGBoost</a:t>
             </a:r>
@@ -6240,7 +6324,15 @@
           <a:p>
             <a:r>
               <a:rPr lang="en-US" sz="2400" dirty="0"/>
-              <a:t>All Features + Bio2vec Embeddings</a:t>
+              <a:t>All Features + </a:t>
+            </a:r>
+            <a:r>
+              <a:rPr lang="en-US" sz="2400" dirty="0" err="1"/>
+              <a:t>BioWordVec</a:t>
+            </a:r>
+            <a:r>
+              <a:rPr lang="en-US" sz="2400" dirty="0"/>
+              <a:t> Embeddings</a:t>
             </a:r>
           </a:p>
         </p:txBody>

</xml_diff>

<commit_message>
table matches code with random_seed
</commit_message>
<xml_diff>
--- a/poster_draft_update_SV Status.pptx
+++ b/poster_draft_update_SV Status.pptx
@@ -4367,14 +4367,14 @@
             </a:ln>
             <a:extLst>
               <a:ext uri="{909E8E84-426E-40dd-AFC4-6F175D3DCCD1}">
-                <a14:hiddenFill xmlns:a14="http://schemas.microsoft.com/office/drawing/2010/main" xmlns="">
+                <a14:hiddenFill xmlns="" xmlns:a14="http://schemas.microsoft.com/office/drawing/2010/main">
                   <a:solidFill>
                     <a:srgbClr val="FFFFFF"/>
                   </a:solidFill>
                 </a14:hiddenFill>
               </a:ext>
               <a:ext uri="{91240B29-F687-4f45-9708-019B960494DF}">
-                <a14:hiddenLine xmlns:a14="http://schemas.microsoft.com/office/drawing/2010/main" xmlns="" w="9525">
+                <a14:hiddenLine xmlns="" xmlns:a14="http://schemas.microsoft.com/office/drawing/2010/main" w="9525">
                   <a:solidFill>
                     <a:srgbClr val="000000"/>
                   </a:solidFill>
@@ -4503,13 +4503,18 @@
                 </a:spcBef>
               </a:pPr>
               <a:r>
-                <a:rPr lang="en-US" altLang="en-US" sz="2939" b="1" dirty="0">
+                <a:rPr lang="en-US" altLang="en-US" sz="2939" b="1" dirty="0" err="1">
                   <a:solidFill>
                     <a:schemeClr val="bg1"/>
                   </a:solidFill>
                 </a:rPr>
-                <a:t>XG Boost</a:t>
+                <a:t>XGBoost</a:t>
               </a:r>
+              <a:endParaRPr lang="en-US" altLang="en-US" sz="2939" b="1" dirty="0">
+                <a:solidFill>
+                  <a:schemeClr val="bg1"/>
+                </a:solidFill>
+              </a:endParaRPr>
             </a:p>
           </p:txBody>
         </p:sp>
@@ -5718,14 +5723,14 @@
             </a:ln>
             <a:extLst>
               <a:ext uri="{909E8E84-426E-40dd-AFC4-6F175D3DCCD1}">
-                <a14:hiddenFill xmlns:a14="http://schemas.microsoft.com/office/drawing/2010/main" xmlns="">
+                <a14:hiddenFill xmlns="" xmlns:a14="http://schemas.microsoft.com/office/drawing/2010/main">
                   <a:solidFill>
                     <a:srgbClr val="FFFFFF"/>
                   </a:solidFill>
                 </a14:hiddenFill>
               </a:ext>
               <a:ext uri="{91240B29-F687-4f45-9708-019B960494DF}">
-                <a14:hiddenLine xmlns:a14="http://schemas.microsoft.com/office/drawing/2010/main" xmlns="" w="9525">
+                <a14:hiddenLine xmlns="" xmlns:a14="http://schemas.microsoft.com/office/drawing/2010/main" w="9525">
                   <a:solidFill>
                     <a:srgbClr val="000000"/>
                   </a:solidFill>
@@ -6264,36 +6269,6 @@
           </a:prstGeom>
         </p:spPr>
       </p:pic>
-      <p:pic>
-        <p:nvPicPr>
-          <p:cNvPr id="22" name="Picture 21">
-            <a:extLst>
-              <a:ext uri="{FF2B5EF4-FFF2-40B4-BE49-F238E27FC236}">
-                <a16:creationId xmlns:a16="http://schemas.microsoft.com/office/drawing/2014/main" id="{C2F26EF3-BD95-4F83-AC1A-61AE797EF04B}"/>
-              </a:ext>
-            </a:extLst>
-          </p:cNvPr>
-          <p:cNvPicPr>
-            <a:picLocks noChangeAspect="1"/>
-          </p:cNvPicPr>
-          <p:nvPr/>
-        </p:nvPicPr>
-        <p:blipFill>
-          <a:blip r:embed="rId9"/>
-          <a:stretch>
-            <a:fillRect/>
-          </a:stretch>
-        </p:blipFill>
-        <p:spPr>
-          <a:xfrm>
-            <a:off x="28879012" y="6338089"/>
-            <a:ext cx="3788758" cy="2685239"/>
-          </a:xfrm>
-          <a:prstGeom prst="rect">
-            <a:avLst/>
-          </a:prstGeom>
-        </p:spPr>
-      </p:pic>
       <p:sp>
         <p:nvSpPr>
           <p:cNvPr id="77" name="TextBox 76">
@@ -6337,53 +6312,6 @@
           </a:p>
         </p:txBody>
       </p:sp>
-      <p:pic>
-        <p:nvPicPr>
-          <p:cNvPr id="1026" name="Picture 2">
-            <a:extLst>
-              <a:ext uri="{FF2B5EF4-FFF2-40B4-BE49-F238E27FC236}">
-                <a16:creationId xmlns:a16="http://schemas.microsoft.com/office/drawing/2014/main" id="{4C858D5F-949F-4138-A437-53FA4966AF6C}"/>
-              </a:ext>
-            </a:extLst>
-          </p:cNvPr>
-          <p:cNvPicPr>
-            <a:picLocks noChangeAspect="1" noChangeArrowheads="1"/>
-          </p:cNvPicPr>
-          <p:nvPr/>
-        </p:nvPicPr>
-        <p:blipFill>
-          <a:blip r:embed="rId10">
-            <a:extLst>
-              <a:ext uri="{28A0092B-C50C-407E-A947-70E740481C1C}">
-                <a14:useLocalDpi xmlns:a14="http://schemas.microsoft.com/office/drawing/2010/main" val="0"/>
-              </a:ext>
-            </a:extLst>
-          </a:blip>
-          <a:srcRect/>
-          <a:stretch>
-            <a:fillRect/>
-          </a:stretch>
-        </p:blipFill>
-        <p:spPr bwMode="auto">
-          <a:xfrm>
-            <a:off x="24797797" y="6324062"/>
-            <a:ext cx="3876135" cy="2713295"/>
-          </a:xfrm>
-          <a:prstGeom prst="rect">
-            <a:avLst/>
-          </a:prstGeom>
-          <a:noFill/>
-          <a:extLst>
-            <a:ext uri="{909E8E84-426E-40DD-AFC4-6F175D3DCCD1}">
-              <a14:hiddenFill xmlns:a14="http://schemas.microsoft.com/office/drawing/2010/main">
-                <a:solidFill>
-                  <a:srgbClr val="FFFFFF"/>
-                </a:solidFill>
-              </a14:hiddenFill>
-            </a:ext>
-          </a:extLst>
-        </p:spPr>
-      </p:pic>
       <p:graphicFrame>
         <p:nvGraphicFramePr>
           <p:cNvPr id="26" name="Table 25">
@@ -6399,7 +6327,7 @@
           <p:nvPr>
             <p:extLst>
               <p:ext uri="{D42A27DB-BD31-4B8C-83A1-F6EECF244321}">
-                <p14:modId xmlns:p14="http://schemas.microsoft.com/office/powerpoint/2010/main" val="2401340542"/>
+                <p14:modId xmlns:p14="http://schemas.microsoft.com/office/powerpoint/2010/main" val="2491744995"/>
               </p:ext>
             </p:extLst>
           </p:nvPr>
@@ -6693,14 +6621,14 @@
                     <a:p>
                       <a:pPr algn="ctr" fontAlgn="b"/>
                       <a:r>
-                        <a:rPr lang="en-US" sz="3200" b="0" i="0" u="none" strike="noStrike">
+                        <a:rPr lang="en-US" sz="3200" b="0" i="0" u="none" strike="noStrike" dirty="0">
                           <a:solidFill>
                             <a:srgbClr val="000000"/>
                           </a:solidFill>
                           <a:effectLst/>
                           <a:latin typeface="Calibri" panose="020F0502020204030204" pitchFamily="34" charset="0"/>
                         </a:rPr>
-                        <a:t>0.741</a:t>
+                        <a:t>0.765</a:t>
                       </a:r>
                     </a:p>
                   </a:txBody>
@@ -6757,7 +6685,7 @@
                           <a:effectLst/>
                           <a:latin typeface="Calibri" panose="020F0502020204030204" pitchFamily="34" charset="0"/>
                         </a:rPr>
-                        <a:t>0.650</a:t>
+                        <a:t>0.649</a:t>
                       </a:r>
                     </a:p>
                   </a:txBody>
@@ -6878,7 +6806,7 @@
                           <a:effectLst/>
                           <a:latin typeface="Calibri" panose="020F0502020204030204" pitchFamily="34" charset="0"/>
                         </a:rPr>
-                        <a:t>0.863</a:t>
+                        <a:t>0.877</a:t>
                       </a:r>
                     </a:p>
                   </a:txBody>
@@ -6928,14 +6856,14 @@
                     <a:p>
                       <a:pPr algn="ctr" fontAlgn="b"/>
                       <a:r>
-                        <a:rPr lang="en-US" sz="3200" b="0" i="0" u="none" strike="noStrike">
+                        <a:rPr lang="en-US" sz="3200" b="0" i="0" u="none" strike="noStrike" dirty="0">
                           <a:solidFill>
                             <a:srgbClr val="000000"/>
                           </a:solidFill>
                           <a:effectLst/>
                           <a:latin typeface="Calibri" panose="020F0502020204030204" pitchFamily="34" charset="0"/>
                         </a:rPr>
-                        <a:t>0.830</a:t>
+                        <a:t>0.834</a:t>
                       </a:r>
                     </a:p>
                   </a:txBody>
@@ -7056,7 +6984,7 @@
                           <a:effectLst/>
                           <a:latin typeface="Calibri" panose="020F0502020204030204" pitchFamily="34" charset="0"/>
                         </a:rPr>
-                        <a:t>0.834</a:t>
+                        <a:t>0.829</a:t>
                       </a:r>
                     </a:p>
                   </a:txBody>
@@ -7113,7 +7041,7 @@
                           <a:effectLst/>
                           <a:latin typeface="Calibri" panose="020F0502020204030204" pitchFamily="34" charset="0"/>
                         </a:rPr>
-                        <a:t>0.741</a:t>
+                        <a:t>0.743</a:t>
                       </a:r>
                     </a:p>
                   </a:txBody>
@@ -7183,7 +7111,7 @@
           </p:nvPr>
         </p:nvPicPr>
         <p:blipFill>
-          <a:blip r:embed="rId11"/>
+          <a:blip r:embed="rId9"/>
           <a:stretch>
             <a:fillRect/>
           </a:stretch>
@@ -7193,6 +7121,100 @@
             <a:off x="9167194" y="14395004"/>
             <a:ext cx="5943612" cy="3657607"/>
           </a:xfrm>
+        </p:spPr>
+      </p:pic>
+      <p:pic>
+        <p:nvPicPr>
+          <p:cNvPr id="2" name="Picture 2">
+            <a:extLst>
+              <a:ext uri="{FF2B5EF4-FFF2-40B4-BE49-F238E27FC236}">
+                <a16:creationId xmlns:a16="http://schemas.microsoft.com/office/drawing/2014/main" id="{2E807E56-41BF-490B-80D3-A22C23C288C4}"/>
+              </a:ext>
+            </a:extLst>
+          </p:cNvPr>
+          <p:cNvPicPr>
+            <a:picLocks noChangeAspect="1" noChangeArrowheads="1"/>
+          </p:cNvPicPr>
+          <p:nvPr/>
+        </p:nvPicPr>
+        <p:blipFill>
+          <a:blip r:embed="rId10">
+            <a:extLst>
+              <a:ext uri="{28A0092B-C50C-407E-A947-70E740481C1C}">
+                <a14:useLocalDpi xmlns:a14="http://schemas.microsoft.com/office/drawing/2010/main" val="0"/>
+              </a:ext>
+            </a:extLst>
+          </a:blip>
+          <a:srcRect/>
+          <a:stretch>
+            <a:fillRect/>
+          </a:stretch>
+        </p:blipFill>
+        <p:spPr bwMode="auto">
+          <a:xfrm>
+            <a:off x="24820568" y="6330367"/>
+            <a:ext cx="3982451" cy="2756059"/>
+          </a:xfrm>
+          <a:prstGeom prst="rect">
+            <a:avLst/>
+          </a:prstGeom>
+          <a:noFill/>
+          <a:extLst>
+            <a:ext uri="{909E8E84-426E-40DD-AFC4-6F175D3DCCD1}">
+              <a14:hiddenFill xmlns:a14="http://schemas.microsoft.com/office/drawing/2010/main">
+                <a:solidFill>
+                  <a:srgbClr val="FFFFFF"/>
+                </a:solidFill>
+              </a14:hiddenFill>
+            </a:ext>
+          </a:extLst>
+        </p:spPr>
+      </p:pic>
+      <p:pic>
+        <p:nvPicPr>
+          <p:cNvPr id="1028" name="Picture 4">
+            <a:extLst>
+              <a:ext uri="{FF2B5EF4-FFF2-40B4-BE49-F238E27FC236}">
+                <a16:creationId xmlns:a16="http://schemas.microsoft.com/office/drawing/2014/main" id="{40EFF23E-A899-4C57-A0C8-8F95ECC0FB79}"/>
+              </a:ext>
+            </a:extLst>
+          </p:cNvPr>
+          <p:cNvPicPr>
+            <a:picLocks noChangeAspect="1" noChangeArrowheads="1"/>
+          </p:cNvPicPr>
+          <p:nvPr/>
+        </p:nvPicPr>
+        <p:blipFill>
+          <a:blip r:embed="rId11">
+            <a:extLst>
+              <a:ext uri="{28A0092B-C50C-407E-A947-70E740481C1C}">
+                <a14:useLocalDpi xmlns:a14="http://schemas.microsoft.com/office/drawing/2010/main" val="0"/>
+              </a:ext>
+            </a:extLst>
+          </a:blip>
+          <a:srcRect/>
+          <a:stretch>
+            <a:fillRect/>
+          </a:stretch>
+        </p:blipFill>
+        <p:spPr bwMode="auto">
+          <a:xfrm>
+            <a:off x="28933161" y="6349360"/>
+            <a:ext cx="3888312" cy="2711914"/>
+          </a:xfrm>
+          <a:prstGeom prst="rect">
+            <a:avLst/>
+          </a:prstGeom>
+          <a:noFill/>
+          <a:extLst>
+            <a:ext uri="{909E8E84-426E-40DD-AFC4-6F175D3DCCD1}">
+              <a14:hiddenFill xmlns:a14="http://schemas.microsoft.com/office/drawing/2010/main">
+                <a:solidFill>
+                  <a:srgbClr val="FFFFFF"/>
+                </a:solidFill>
+              </a14:hiddenFill>
+            </a:ext>
+          </a:extLst>
         </p:spPr>
       </p:pic>
     </p:spTree>

</xml_diff>

<commit_message>
table in poster matches random_seed in code
</commit_message>
<xml_diff>
--- a/poster_draft_update_SV Status.pptx
+++ b/poster_draft_update_SV Status.pptx
@@ -311,7 +311,7 @@
             <a:pPr>
               <a:defRPr/>
             </a:pPr>
-            <a:endParaRPr lang="en-US"/>
+            <a:endParaRPr lang="en-US" dirty="0"/>
           </a:p>
         </p:txBody>
       </p:sp>
@@ -364,7 +364,7 @@
             <a:pPr>
               <a:defRPr/>
             </a:pPr>
-            <a:endParaRPr lang="en-US"/>
+            <a:endParaRPr lang="en-US" dirty="0"/>
           </a:p>
         </p:txBody>
       </p:sp>
@@ -417,7 +417,7 @@
             <a:pPr>
               <a:defRPr/>
             </a:pPr>
-            <a:endParaRPr lang="en-US"/>
+            <a:endParaRPr lang="en-US" dirty="0"/>
           </a:p>
         </p:txBody>
       </p:sp>
@@ -469,7 +469,7 @@
               <a:pPr/>
               <a:t>‹#›</a:t>
             </a:fld>
-            <a:endParaRPr lang="en-US"/>
+            <a:endParaRPr lang="en-US" dirty="0"/>
           </a:p>
         </p:txBody>
       </p:sp>
@@ -558,7 +558,7 @@
             <a:pPr>
               <a:defRPr/>
             </a:pPr>
-            <a:endParaRPr lang="en-US"/>
+            <a:endParaRPr lang="en-US" dirty="0"/>
           </a:p>
         </p:txBody>
       </p:sp>
@@ -611,7 +611,7 @@
             <a:pPr>
               <a:defRPr/>
             </a:pPr>
-            <a:endParaRPr lang="en-US"/>
+            <a:endParaRPr lang="en-US" dirty="0"/>
           </a:p>
         </p:txBody>
       </p:sp>
@@ -764,7 +764,7 @@
             <a:pPr>
               <a:defRPr/>
             </a:pPr>
-            <a:endParaRPr lang="en-US"/>
+            <a:endParaRPr lang="en-US" dirty="0"/>
           </a:p>
         </p:txBody>
       </p:sp>
@@ -816,7 +816,7 @@
               <a:pPr/>
               <a:t>‹#›</a:t>
             </a:fld>
-            <a:endParaRPr lang="en-US"/>
+            <a:endParaRPr lang="en-US" dirty="0"/>
           </a:p>
         </p:txBody>
       </p:sp>
@@ -1026,7 +1026,7 @@
               <a:pPr/>
               <a:t>1</a:t>
             </a:fld>
-            <a:endParaRPr lang="en-US"/>
+            <a:endParaRPr lang="en-US" dirty="0"/>
           </a:p>
         </p:txBody>
       </p:sp>
@@ -2638,7 +2638,7 @@
           </a:lstStyle>
           <a:p>
             <a:pPr lvl="0"/>
-            <a:endParaRPr lang="en-US" noProof="0"/>
+            <a:endParaRPr lang="en-US" noProof="0" dirty="0"/>
           </a:p>
         </p:txBody>
       </p:sp>
@@ -2889,7 +2889,7 @@
               </a:spcBef>
               <a:defRPr/>
             </a:pPr>
-            <a:endParaRPr lang="en-US" sz="2367"/>
+            <a:endParaRPr lang="en-US" sz="2367" dirty="0"/>
           </a:p>
         </p:txBody>
       </p:sp>
@@ -3390,7 +3390,7 @@
           <a:bodyPr wrap="none" anchor="ctr"/>
           <a:lstStyle/>
           <a:p>
-            <a:endParaRPr lang="en-US" sz="8655"/>
+            <a:endParaRPr lang="en-US" sz="8655" dirty="0"/>
           </a:p>
         </p:txBody>
       </p:sp>
@@ -3436,7 +3436,7 @@
           <a:bodyPr wrap="none" anchor="ctr"/>
           <a:lstStyle/>
           <a:p>
-            <a:endParaRPr lang="en-US" sz="8655"/>
+            <a:endParaRPr lang="en-US" sz="8655" dirty="0"/>
           </a:p>
         </p:txBody>
       </p:sp>
@@ -3553,7 +3553,7 @@
             <a:bodyPr wrap="none" anchor="ctr"/>
             <a:lstStyle/>
             <a:p>
-              <a:endParaRPr lang="en-US" sz="8655"/>
+              <a:endParaRPr lang="en-US" sz="8655" dirty="0"/>
             </a:p>
           </p:txBody>
         </p:sp>
@@ -3660,7 +3660,7 @@
             <a:bodyPr wrap="none" anchor="ctr"/>
             <a:lstStyle/>
             <a:p>
-              <a:endParaRPr lang="en-US" sz="8655"/>
+              <a:endParaRPr lang="en-US" sz="8655" dirty="0"/>
             </a:p>
           </p:txBody>
         </p:sp>
@@ -3767,7 +3767,7 @@
             <a:bodyPr wrap="none" anchor="ctr"/>
             <a:lstStyle/>
             <a:p>
-              <a:endParaRPr lang="en-US" sz="8655"/>
+              <a:endParaRPr lang="en-US" sz="8655" dirty="0"/>
             </a:p>
           </p:txBody>
         </p:sp>
@@ -3874,7 +3874,7 @@
             <a:bodyPr wrap="none" anchor="ctr"/>
             <a:lstStyle/>
             <a:p>
-              <a:endParaRPr lang="en-US" sz="8655"/>
+              <a:endParaRPr lang="en-US" sz="8655" dirty="0"/>
             </a:p>
           </p:txBody>
         </p:sp>
@@ -3952,7 +3952,7 @@
           <a:bodyPr wrap="none" anchor="ctr"/>
           <a:lstStyle/>
           <a:p>
-            <a:endParaRPr lang="en-US" sz="8655"/>
+            <a:endParaRPr lang="en-US" sz="8655" dirty="0"/>
           </a:p>
         </p:txBody>
       </p:sp>
@@ -4012,7 +4012,7 @@
             <a:bodyPr wrap="none" anchor="ctr"/>
             <a:lstStyle/>
             <a:p>
-              <a:endParaRPr lang="en-US" sz="8655"/>
+              <a:endParaRPr lang="en-US" sz="8655" dirty="0"/>
             </a:p>
           </p:txBody>
         </p:sp>
@@ -4119,7 +4119,7 @@
             <a:bodyPr wrap="none" anchor="ctr"/>
             <a:lstStyle/>
             <a:p>
-              <a:endParaRPr lang="en-US" sz="8655"/>
+              <a:endParaRPr lang="en-US" sz="8655" dirty="0"/>
             </a:p>
           </p:txBody>
         </p:sp>
@@ -4159,20 +4159,12 @@
                 </a:spcBef>
               </a:pPr>
               <a:r>
-                <a:rPr lang="en-US" altLang="en-US" sz="2939" b="1" dirty="0" err="1">
-                  <a:solidFill>
-                    <a:schemeClr val="bg1"/>
-                  </a:solidFill>
-                </a:rPr>
-                <a:t>BioWordVec</a:t>
-              </a:r>
-              <a:r>
                 <a:rPr lang="en-US" altLang="en-US" sz="2939" b="1" dirty="0">
                   <a:solidFill>
                     <a:schemeClr val="bg1"/>
                   </a:solidFill>
                 </a:rPr>
-                <a:t> </a:t>
+                <a:t>BioWordVec </a:t>
               </a:r>
             </a:p>
           </p:txBody>
@@ -4367,14 +4359,14 @@
             </a:ln>
             <a:extLst>
               <a:ext uri="{909E8E84-426E-40dd-AFC4-6F175D3DCCD1}">
-                <a14:hiddenFill xmlns="" xmlns:a14="http://schemas.microsoft.com/office/drawing/2010/main">
+                <a14:hiddenFill xmlns:a14="http://schemas.microsoft.com/office/drawing/2010/main" xmlns="">
                   <a:solidFill>
                     <a:srgbClr val="FFFFFF"/>
                   </a:solidFill>
                 </a14:hiddenFill>
               </a:ext>
               <a:ext uri="{91240B29-F687-4f45-9708-019B960494DF}">
-                <a14:hiddenLine xmlns="" xmlns:a14="http://schemas.microsoft.com/office/drawing/2010/main" w="9525">
+                <a14:hiddenLine xmlns:a14="http://schemas.microsoft.com/office/drawing/2010/main" xmlns="" w="9525">
                   <a:solidFill>
                     <a:srgbClr val="000000"/>
                   </a:solidFill>
@@ -4503,18 +4495,13 @@
                 </a:spcBef>
               </a:pPr>
               <a:r>
-                <a:rPr lang="en-US" altLang="en-US" sz="2939" b="1" dirty="0" err="1">
+                <a:rPr lang="en-US" altLang="en-US" sz="2939" b="1" dirty="0">
                   <a:solidFill>
                     <a:schemeClr val="bg1"/>
                   </a:solidFill>
                 </a:rPr>
                 <a:t>XGBoost</a:t>
               </a:r>
-              <a:endParaRPr lang="en-US" altLang="en-US" sz="2939" b="1" dirty="0">
-                <a:solidFill>
-                  <a:schemeClr val="bg1"/>
-                </a:solidFill>
-              </a:endParaRPr>
             </a:p>
           </p:txBody>
         </p:sp>
@@ -4587,7 +4574,7 @@
             <a:bodyPr wrap="none" anchor="ctr"/>
             <a:lstStyle/>
             <a:p>
-              <a:endParaRPr lang="en-US" sz="8655"/>
+              <a:endParaRPr lang="en-US" sz="8655" dirty="0"/>
             </a:p>
           </p:txBody>
         </p:sp>
@@ -4678,7 +4665,7 @@
             </a:pPr>
             <a:r>
               <a:rPr lang="en-US" sz="2400" dirty="0"/>
-              <a:t>Pediatric Heart Transplant Study Database was used to identify Single Ventricle (SV) Heart Disease</a:t>
+              <a:t>Pediatric Heart Transplant Society Database was used to identify Single Ventricle (SV) Heart Disease</a:t>
             </a:r>
           </a:p>
           <a:p>
@@ -4688,7 +4675,7 @@
             </a:pPr>
             <a:r>
               <a:rPr lang="en-US" sz="2400" dirty="0"/>
-              <a:t>Donor, transplant and recipient information for these patients was collected</a:t>
+              <a:t>Donor, transplant, and listing information for these patients was collected</a:t>
             </a:r>
           </a:p>
           <a:p>
@@ -4698,7 +4685,7 @@
             </a:pPr>
             <a:r>
               <a:rPr lang="en-US" sz="2400" dirty="0"/>
-              <a:t>p-value of &lt;0.05 is considered statistically significant and Survival was compared using SAS 9.4. Machine Learning was complete using Python 3.5.2</a:t>
+              <a:t>Machine Learning was complete using Python 3.5.2 p-value of &lt;0.05 is considered statistically significant and Survival was compared using SAS 9.4. </a:t>
             </a:r>
           </a:p>
           <a:p>
@@ -4865,15 +4852,7 @@
             </a:pPr>
             <a:r>
               <a:rPr lang="en-US" sz="2400" dirty="0"/>
-              <a:t>Patients that are single ventricle are of very high clinical interest as their risk for death or </a:t>
-            </a:r>
-            <a:r>
-              <a:rPr lang="en-US" sz="2400" dirty="0" err="1"/>
-              <a:t>retransplant</a:t>
-            </a:r>
-            <a:r>
-              <a:rPr lang="en-US" sz="2400" dirty="0"/>
-              <a:t> is greater as seen in the Kaplan-Meier, p&lt;0.0001</a:t>
+              <a:t>Patients that are single ventricle are of very high clinical interest as their risk for death or retransplant is greater as seen in the Kaplan-Meier, p&lt;0.0001</a:t>
             </a:r>
           </a:p>
         </p:txBody>
@@ -5066,12 +5045,8 @@
           <a:lstStyle/>
           <a:p>
             <a:r>
-              <a:rPr lang="en-US" sz="2400" dirty="0" err="1"/>
-              <a:t>WordCloud</a:t>
-            </a:r>
-            <a:r>
               <a:rPr lang="en-US" sz="2400" dirty="0"/>
-              <a:t> representing all keywords in the Other Specify Fields</a:t>
+              <a:t>WordCloud representing all keywords in the Other Specify Fields</a:t>
             </a:r>
           </a:p>
         </p:txBody>
@@ -5256,7 +5231,7 @@
             <a:bodyPr wrap="none" anchor="ctr"/>
             <a:lstStyle/>
             <a:p>
-              <a:endParaRPr lang="en-US" sz="8655"/>
+              <a:endParaRPr lang="en-US" sz="8655" dirty="0"/>
             </a:p>
           </p:txBody>
         </p:sp>
@@ -5344,12 +5319,8 @@
               <a:buChar char="•"/>
             </a:pPr>
             <a:r>
-              <a:rPr lang="en-US" sz="2400" dirty="0" err="1"/>
-              <a:t>Hypoplastic</a:t>
-            </a:r>
-            <a:r>
               <a:rPr lang="en-US" sz="2400" dirty="0"/>
-              <a:t> Left Heart</a:t>
+              <a:t>Hypoplastic Left Heart</a:t>
             </a:r>
           </a:p>
           <a:p>
@@ -5407,98 +5378,13 @@
               <a:buChar char="•"/>
             </a:pPr>
             <a:r>
-              <a:rPr lang="en-US" sz="2400" dirty="0" err="1">
-                <a:solidFill>
-                  <a:schemeClr val="tx1"/>
-                </a:solidFill>
-              </a:rPr>
-              <a:t>BioWordVec</a:t>
-            </a:r>
-            <a:r>
               <a:rPr lang="en-US" sz="2400" dirty="0">
                 <a:solidFill>
                   <a:schemeClr val="tx1"/>
                 </a:solidFill>
               </a:rPr>
-              <a:t> is a </a:t>
-            </a:r>
-            <a:r>
-              <a:rPr lang="en-US" sz="2400" dirty="0" err="1">
-                <a:solidFill>
-                  <a:schemeClr val="tx1"/>
-                </a:solidFill>
-              </a:rPr>
-              <a:t>fastText</a:t>
-            </a:r>
-            <a:r>
-              <a:rPr lang="en-US" sz="2400" dirty="0">
-                <a:solidFill>
-                  <a:schemeClr val="tx1"/>
-                </a:solidFill>
-              </a:rPr>
-              <a:t> model for creating biomedical word embeddings with </a:t>
-            </a:r>
-            <a:r>
-              <a:rPr lang="en-US" sz="2400" dirty="0" err="1">
-                <a:solidFill>
-                  <a:schemeClr val="tx1"/>
-                </a:solidFill>
-              </a:rPr>
-              <a:t>subword</a:t>
-            </a:r>
-            <a:r>
-              <a:rPr lang="en-US" sz="2400" dirty="0">
-                <a:solidFill>
-                  <a:schemeClr val="tx1"/>
-                </a:solidFill>
-              </a:rPr>
-              <a:t> information. It was trained using the PubMed corpora and </a:t>
-            </a:r>
-            <a:r>
-              <a:rPr lang="en-US" sz="2400" dirty="0" err="1">
-                <a:solidFill>
-                  <a:schemeClr val="tx1"/>
-                </a:solidFill>
-              </a:rPr>
-              <a:t>MeSH</a:t>
-            </a:r>
-            <a:r>
-              <a:rPr lang="en-US" sz="2400" dirty="0">
-                <a:solidFill>
-                  <a:schemeClr val="tx1"/>
-                </a:solidFill>
-              </a:rPr>
-              <a:t>. The use of </a:t>
-            </a:r>
-            <a:r>
-              <a:rPr lang="en-US" sz="2400" dirty="0" err="1">
-                <a:solidFill>
-                  <a:schemeClr val="tx1"/>
-                </a:solidFill>
-              </a:rPr>
-              <a:t>subwords</a:t>
-            </a:r>
-            <a:r>
-              <a:rPr lang="en-US" sz="2400" dirty="0">
-                <a:solidFill>
-                  <a:schemeClr val="tx1"/>
-                </a:solidFill>
-              </a:rPr>
-              <a:t> allows the model to produce embedding for </a:t>
-            </a:r>
-            <a:r>
-              <a:rPr lang="en-US" sz="2400">
-                <a:solidFill>
-                  <a:schemeClr val="tx1"/>
-                </a:solidFill>
-              </a:rPr>
-              <a:t>OOV tokens. </a:t>
-            </a:r>
-            <a:endParaRPr lang="en-US" sz="2400" dirty="0">
-              <a:solidFill>
-                <a:schemeClr val="tx1"/>
-              </a:solidFill>
-            </a:endParaRPr>
+              <a:t>BioWordVec is a fastText model for creating biomedical word embeddings with subword information. It was trained using the PubMed corpora and MeSH. The use of subwords allows the model to produce embedding for OOV tokens. </a:t>
+            </a:r>
           </a:p>
           <a:p>
             <a:pPr marL="342900" indent="-342900" algn="l">
@@ -5723,14 +5609,14 @@
             </a:ln>
             <a:extLst>
               <a:ext uri="{909E8E84-426E-40dd-AFC4-6F175D3DCCD1}">
-                <a14:hiddenFill xmlns="" xmlns:a14="http://schemas.microsoft.com/office/drawing/2010/main">
+                <a14:hiddenFill xmlns:a14="http://schemas.microsoft.com/office/drawing/2010/main" xmlns="">
                   <a:solidFill>
                     <a:srgbClr val="FFFFFF"/>
                   </a:solidFill>
                 </a14:hiddenFill>
               </a:ext>
               <a:ext uri="{91240B29-F687-4f45-9708-019B960494DF}">
-                <a14:hiddenLine xmlns="" xmlns:a14="http://schemas.microsoft.com/office/drawing/2010/main" w="9525">
+                <a14:hiddenLine xmlns:a14="http://schemas.microsoft.com/office/drawing/2010/main" xmlns="" w="9525">
                   <a:solidFill>
                     <a:srgbClr val="000000"/>
                   </a:solidFill>
@@ -5924,15 +5810,7 @@
             </a:pPr>
             <a:r>
               <a:rPr lang="en-US" sz="2400" dirty="0"/>
-              <a:t>Logistic Regression, SVM, Decision Trees, and </a:t>
-            </a:r>
-            <a:r>
-              <a:rPr lang="en-US" sz="2400" dirty="0" err="1"/>
-              <a:t>XGBoost</a:t>
-            </a:r>
-            <a:r>
-              <a:rPr lang="en-US" sz="2400" dirty="0"/>
-              <a:t> were all used to analyze 3 separate machine learnings models:</a:t>
+              <a:t>Logistic Regression, SVM, Decision Trees, and XGBoost were all used to analyze 3 separate machine learnings models:</a:t>
             </a:r>
           </a:p>
           <a:p>
@@ -5981,12 +5859,8 @@
               <a:buChar char="•"/>
             </a:pPr>
             <a:r>
-              <a:rPr lang="en-US" sz="2400" dirty="0" err="1"/>
-              <a:t>XGBoost</a:t>
-            </a:r>
-            <a:r>
               <a:rPr lang="en-US" sz="2400" dirty="0"/>
-              <a:t> performed the best out of all models, with accuracy close to 90% and an AUC of 0.8.</a:t>
+              <a:t>XGBoost performed the best out of all models, with accuracy close to 90% and an AUC of 0.8.</a:t>
             </a:r>
           </a:p>
         </p:txBody>
@@ -6199,12 +6073,8 @@
               <a:buChar char="•"/>
             </a:pPr>
             <a:r>
-              <a:rPr lang="en-US" sz="2400" dirty="0" err="1"/>
-              <a:t>XGBoost</a:t>
-            </a:r>
-            <a:r>
               <a:rPr lang="en-US" sz="2400" dirty="0"/>
-              <a:t> is a decision-tree-based ensemble Machine Learning algorithm that uses a gradient boosting framework. When it comes to small-to-medium structured/tabular data, decision tree based algorithms are considered best-in-class right now.</a:t>
+              <a:t>XGBoost is a decision-tree-based ensemble Machine Learning algorithm that uses a gradient boosting framework. When it comes to small-to-medium structured/tabular data, decision tree based algorithms are considered best-in-class right now.</a:t>
             </a:r>
           </a:p>
         </p:txBody>
@@ -6299,15 +6169,7 @@
           <a:p>
             <a:r>
               <a:rPr lang="en-US" sz="2400" dirty="0"/>
-              <a:t>All Features + </a:t>
-            </a:r>
-            <a:r>
-              <a:rPr lang="en-US" sz="2400" dirty="0" err="1"/>
-              <a:t>BioWordVec</a:t>
-            </a:r>
-            <a:r>
-              <a:rPr lang="en-US" sz="2400" dirty="0"/>
-              <a:t> Embeddings</a:t>
+              <a:t>All Features + BioWordVec Embeddings</a:t>
             </a:r>
           </a:p>
         </p:txBody>
@@ -6920,7 +6782,7 @@
                     <a:p>
                       <a:pPr algn="l" fontAlgn="b"/>
                       <a:r>
-                        <a:rPr lang="en-US" sz="3200" b="0" i="0" u="none" strike="noStrike">
+                        <a:rPr lang="en-US" sz="3200" b="0" i="0" u="none" strike="noStrike" dirty="0">
                           <a:solidFill>
                             <a:srgbClr val="000000"/>
                           </a:solidFill>

</xml_diff>